<commit_message>
fix rec 5 typos
</commit_message>
<xml_diff>
--- a/files/5_Github.pptx
+++ b/files/5_Github.pptx
@@ -312,7 +312,7 @@
               <a:pPr>
                 <a:defRPr/>
               </a:pPr>
-              <a:t>2/10/26</a:t>
+              <a:t>2/11/26</a:t>
             </a:fld>
             <a:endParaRPr lang="en-US"/>
           </a:p>
@@ -7457,7 +7457,7 @@
           <a:p>
             <a:r>
               <a:rPr lang="en-US" sz="1800" dirty="0"/>
-              <a:t>Select “HTML”, then copy the link</a:t>
+              <a:t>Select “HTTPS”, then copy the link</a:t>
             </a:r>
           </a:p>
           <a:p>
@@ -7618,12 +7618,6 @@
           <a:p>
             <a:r>
               <a:rPr lang="en-US" sz="1800" dirty="0"/>
-              <a:t>You may need to log in to git for this to work</a:t>
-            </a:r>
-          </a:p>
-          <a:p>
-            <a:r>
-              <a:rPr lang="en-US" sz="1800" dirty="0"/>
               <a:t>Set your global git config file so that Git knows who you are</a:t>
             </a:r>
           </a:p>
@@ -7656,7 +7650,7 @@
             </a:r>
             <a:r>
               <a:rPr lang="en-US" sz="1800" dirty="0" err="1"/>
-              <a:t>user.emal</a:t>
+              <a:t>user.email</a:t>
             </a:r>
             <a:r>
               <a:rPr lang="en-US" sz="1800" dirty="0"/>

</xml_diff>